<commit_message>
Version 2 : Revised PPT
</commit_message>
<xml_diff>
--- a/PPT/C-in-logistic-regression-parameter_Mahesh_Kumar_Sahoo.pptx
+++ b/PPT/C-in-logistic-regression-parameter_Mahesh_Kumar_Sahoo.pptx
@@ -5,7 +5,9 @@
     <p:sldMasterId id="2147483648" r:id="rId1"/>
   </p:sldMasterIdLst>
   <p:sldIdLst>
-    <p:sldId id="257" r:id="rId2"/>
+    <p:sldId id="259" r:id="rId2"/>
+    <p:sldId id="258" r:id="rId3"/>
+    <p:sldId id="257" r:id="rId4"/>
   </p:sldIdLst>
   <p:sldSz cx="9144000" cy="6858000" type="screen4x3"/>
   <p:notesSz cx="6858000" cy="9144000"/>
@@ -3066,13 +3068,66 @@
             <a:spLocks noGrp="1"/>
           </p:cNvSpPr>
           <p:nvPr>
+            <p:ph type="ctrTitle"/>
+          </p:nvPr>
+        </p:nvSpPr>
+        <p:spPr>
+          <a:xfrm>
+            <a:off x="685800" y="2590800"/>
+            <a:ext cx="7772400" cy="1600200"/>
+          </a:xfrm>
+        </p:spPr>
+        <p:txBody>
+          <a:bodyPr/>
+          <a:lstStyle/>
+          <a:p>
+            <a:r>
+              <a:rPr lang="en-US" dirty="0" smtClean="0"/>
+              <a:t>C in logistic regression parameter</a:t>
+            </a:r>
+            <a:endParaRPr lang="en-US" dirty="0"/>
+          </a:p>
+        </p:txBody>
+      </p:sp>
+    </p:spTree>
+  </p:cSld>
+  <p:clrMapOvr>
+    <a:masterClrMapping/>
+  </p:clrMapOvr>
+</p:sld>
+</file>
+
+<file path=ppt/slides/slide2.xml><?xml version="1.0" encoding="utf-8"?>
+<p:sld xmlns:a="http://schemas.openxmlformats.org/drawingml/2006/main" xmlns:r="http://schemas.openxmlformats.org/officeDocument/2006/relationships" xmlns:p="http://schemas.openxmlformats.org/presentationml/2006/main">
+  <p:cSld>
+    <p:spTree>
+      <p:nvGrpSpPr>
+        <p:cNvPr id="1" name=""/>
+        <p:cNvGrpSpPr/>
+        <p:nvPr/>
+      </p:nvGrpSpPr>
+      <p:grpSpPr>
+        <a:xfrm>
+          <a:off x="0" y="0"/>
+          <a:ext cx="0" cy="0"/>
+          <a:chOff x="0" y="0"/>
+          <a:chExt cx="0" cy="0"/>
+        </a:xfrm>
+      </p:grpSpPr>
+      <p:sp>
+        <p:nvSpPr>
+          <p:cNvPr id="2" name="Title 1"/>
+          <p:cNvSpPr>
+            <a:spLocks noGrp="1"/>
+          </p:cNvSpPr>
+          <p:nvPr>
             <p:ph type="title"/>
           </p:nvPr>
         </p:nvSpPr>
         <p:spPr>
           <a:xfrm>
             <a:off x="457200" y="274638"/>
-            <a:ext cx="8229600" cy="792162"/>
+            <a:ext cx="8229600" cy="944562"/>
           </a:xfrm>
         </p:spPr>
         <p:txBody>
@@ -3081,15 +3136,7 @@
           <a:p>
             <a:r>
               <a:rPr lang="en-US" dirty="0" smtClean="0"/>
-              <a:t>C in </a:t>
-            </a:r>
-            <a:r>
-              <a:rPr lang="en-US" dirty="0" smtClean="0"/>
-              <a:t>logistic regression </a:t>
-            </a:r>
-            <a:r>
-              <a:rPr lang="en-US" dirty="0" smtClean="0"/>
-              <a:t>parameter</a:t>
+              <a:t>logistic regression</a:t>
             </a:r>
             <a:endParaRPr lang="en-US" dirty="0"/>
           </a:p>
@@ -3107,8 +3154,8 @@
         </p:nvSpPr>
         <p:spPr>
           <a:xfrm>
-            <a:off x="228600" y="1143000"/>
-            <a:ext cx="8686800" cy="5486400"/>
+            <a:off x="457200" y="1143000"/>
+            <a:ext cx="8229600" cy="5334000"/>
           </a:xfrm>
         </p:spPr>
         <p:txBody>
@@ -3118,266 +3165,58 @@
           <a:lstStyle/>
           <a:p>
             <a:r>
-              <a:rPr lang="en-US" sz="1800" dirty="0" smtClean="0">
-                <a:latin typeface="Arial" pitchFamily="34" charset="0"/>
-                <a:cs typeface="Arial" pitchFamily="34" charset="0"/>
-              </a:rPr>
-              <a:t>It is used to represent the </a:t>
-            </a:r>
-            <a:r>
-              <a:rPr lang="en-US" sz="1800" dirty="0" smtClean="0">
-                <a:latin typeface="Arial" pitchFamily="34" charset="0"/>
-                <a:cs typeface="Arial" pitchFamily="34" charset="0"/>
-              </a:rPr>
-              <a:t>regularization </a:t>
-            </a:r>
-            <a:r>
-              <a:rPr lang="en-US" sz="1800" dirty="0" smtClean="0">
-                <a:latin typeface="Arial" pitchFamily="34" charset="0"/>
-                <a:cs typeface="Arial" pitchFamily="34" charset="0"/>
-              </a:rPr>
-              <a:t>strength and floats.</a:t>
-            </a:r>
+              <a:rPr lang="en-US" sz="2400" dirty="0" smtClean="0"/>
+              <a:t>Logistic regression is used to solve classification problems, and the most common use case is binary logistic regression, where the outcome is binary (yes or no</a:t>
+            </a:r>
+            <a:r>
+              <a:rPr lang="en-US" sz="2400" dirty="0" smtClean="0"/>
+              <a:t>).</a:t>
+            </a:r>
+            <a:r>
+              <a:rPr lang="en-US" sz="2400" dirty="0" smtClean="0"/>
+              <a:t> In the real world, you can see logistic regression applied across multiple areas and fields.</a:t>
+            </a:r>
+            <a:endParaRPr lang="en-US" sz="2400" dirty="0" smtClean="0"/>
+          </a:p>
+          <a:p>
+            <a:r>
+              <a:rPr lang="en-US" sz="2400" dirty="0" smtClean="0"/>
+              <a:t>health </a:t>
+            </a:r>
+            <a:r>
+              <a:rPr lang="en-US" sz="2400" dirty="0" smtClean="0"/>
+              <a:t>care, </a:t>
+            </a:r>
+            <a:r>
+              <a:rPr lang="en-US" sz="2400" dirty="0" smtClean="0"/>
+              <a:t>financial </a:t>
+            </a:r>
+            <a:r>
+              <a:rPr lang="en-US" sz="2400" dirty="0" smtClean="0"/>
+              <a:t>industry,..etc</a:t>
+            </a:r>
+            <a:endParaRPr lang="en-US" sz="2400" dirty="0" smtClean="0"/>
+          </a:p>
+          <a:p>
+            <a:endParaRPr lang="en-US" dirty="0" smtClean="0"/>
           </a:p>
           <a:p>
             <a:pPr>
               <a:buNone/>
             </a:pPr>
-            <a:endParaRPr lang="en-US" sz="800" dirty="0" smtClean="0">
-              <a:latin typeface="Arial" pitchFamily="34" charset="0"/>
-              <a:cs typeface="Arial" pitchFamily="34" charset="0"/>
-            </a:endParaRPr>
-          </a:p>
-          <a:p>
-            <a:r>
-              <a:rPr lang="en-US" sz="1800" dirty="0" smtClean="0"/>
-              <a:t>“</a:t>
-            </a:r>
-            <a:r>
-              <a:rPr lang="en-US" sz="1800" dirty="0" smtClean="0">
-                <a:latin typeface="Arial" pitchFamily="34" charset="0"/>
-                <a:cs typeface="Arial" pitchFamily="34" charset="0"/>
-              </a:rPr>
-              <a:t>Regularization </a:t>
-            </a:r>
-            <a:r>
-              <a:rPr lang="en-US" sz="1800" dirty="0" smtClean="0">
-                <a:latin typeface="Arial" pitchFamily="34" charset="0"/>
-                <a:cs typeface="Arial" pitchFamily="34" charset="0"/>
-              </a:rPr>
-              <a:t>is any modification we make to a learning algorithm that is intended to reduce its generalization error but not its training error</a:t>
-            </a:r>
-            <a:r>
-              <a:rPr lang="en-US" sz="1800" dirty="0" smtClean="0">
-                <a:latin typeface="Arial" pitchFamily="34" charset="0"/>
-                <a:cs typeface="Arial" pitchFamily="34" charset="0"/>
-              </a:rPr>
-              <a:t>. ”  In </a:t>
-            </a:r>
-            <a:r>
-              <a:rPr lang="en-US" sz="1800" dirty="0" smtClean="0">
-                <a:latin typeface="Arial" pitchFamily="34" charset="0"/>
-                <a:cs typeface="Arial" pitchFamily="34" charset="0"/>
-              </a:rPr>
-              <a:t>other words: regularization can be used to train models that generalize better on unseen data, by preventing the algorithm from </a:t>
-            </a:r>
-            <a:r>
-              <a:rPr lang="en-US" sz="1800" dirty="0" smtClean="0">
-                <a:latin typeface="Arial" pitchFamily="34" charset="0"/>
-                <a:cs typeface="Arial" pitchFamily="34" charset="0"/>
-              </a:rPr>
-              <a:t>over fitting </a:t>
-            </a:r>
-            <a:r>
-              <a:rPr lang="en-US" sz="1800" dirty="0" smtClean="0">
-                <a:latin typeface="Arial" pitchFamily="34" charset="0"/>
-                <a:cs typeface="Arial" pitchFamily="34" charset="0"/>
-              </a:rPr>
-              <a:t>the training </a:t>
-            </a:r>
-            <a:r>
-              <a:rPr lang="en-US" sz="1800" dirty="0" smtClean="0">
-                <a:latin typeface="Arial" pitchFamily="34" charset="0"/>
-                <a:cs typeface="Arial" pitchFamily="34" charset="0"/>
-              </a:rPr>
-              <a:t>dataset.</a:t>
-            </a:r>
-          </a:p>
-          <a:p>
-            <a:endParaRPr lang="en-US" sz="800" dirty="0" smtClean="0">
-              <a:latin typeface="Arial" pitchFamily="34" charset="0"/>
-              <a:cs typeface="Arial" pitchFamily="34" charset="0"/>
-            </a:endParaRPr>
-          </a:p>
-          <a:p>
-            <a:endParaRPr lang="en-US" sz="800" dirty="0" smtClean="0">
-              <a:latin typeface="Arial" pitchFamily="34" charset="0"/>
-              <a:cs typeface="Arial" pitchFamily="34" charset="0"/>
-            </a:endParaRPr>
-          </a:p>
-          <a:p>
-            <a:endParaRPr lang="en-US" sz="800" dirty="0" smtClean="0">
-              <a:latin typeface="Arial" pitchFamily="34" charset="0"/>
-              <a:cs typeface="Arial" pitchFamily="34" charset="0"/>
-            </a:endParaRPr>
+            <a:endParaRPr lang="en-US" dirty="0" smtClean="0"/>
+          </a:p>
+          <a:p>
+            <a:endParaRPr lang="en-US" dirty="0" smtClean="0"/>
+          </a:p>
+          <a:p>
+            <a:endParaRPr lang="en-US" dirty="0" smtClean="0"/>
           </a:p>
           <a:p>
             <a:pPr>
               <a:buNone/>
             </a:pPr>
-            <a:endParaRPr lang="en-US" sz="800" dirty="0" smtClean="0">
-              <a:latin typeface="Arial" pitchFamily="34" charset="0"/>
-              <a:cs typeface="Arial" pitchFamily="34" charset="0"/>
-            </a:endParaRPr>
-          </a:p>
-          <a:p>
-            <a:pPr>
-              <a:buNone/>
-            </a:pPr>
-            <a:endParaRPr lang="en-US" sz="800" dirty="0" smtClean="0">
-              <a:latin typeface="Arial" pitchFamily="34" charset="0"/>
-              <a:cs typeface="Arial" pitchFamily="34" charset="0"/>
-            </a:endParaRPr>
-          </a:p>
-          <a:p>
-            <a:pPr>
-              <a:buNone/>
-            </a:pPr>
-            <a:endParaRPr lang="en-US" sz="800" dirty="0" smtClean="0">
-              <a:latin typeface="Arial" pitchFamily="34" charset="0"/>
-              <a:cs typeface="Arial" pitchFamily="34" charset="0"/>
-            </a:endParaRPr>
-          </a:p>
-          <a:p>
-            <a:pPr>
-              <a:buNone/>
-            </a:pPr>
-            <a:endParaRPr lang="en-US" sz="800" dirty="0" smtClean="0">
-              <a:latin typeface="Arial" pitchFamily="34" charset="0"/>
-              <a:cs typeface="Arial" pitchFamily="34" charset="0"/>
-            </a:endParaRPr>
-          </a:p>
-          <a:p>
-            <a:pPr>
-              <a:buNone/>
-            </a:pPr>
-            <a:endParaRPr lang="en-US" sz="800" dirty="0" smtClean="0">
-              <a:latin typeface="Arial" pitchFamily="34" charset="0"/>
-              <a:cs typeface="Arial" pitchFamily="34" charset="0"/>
-            </a:endParaRPr>
-          </a:p>
-          <a:p>
-            <a:pPr>
-              <a:buNone/>
-            </a:pPr>
-            <a:endParaRPr lang="en-US" sz="800" dirty="0" smtClean="0">
-              <a:latin typeface="Arial" pitchFamily="34" charset="0"/>
-              <a:cs typeface="Arial" pitchFamily="34" charset="0"/>
-            </a:endParaRPr>
-          </a:p>
-          <a:p>
-            <a:pPr>
-              <a:buNone/>
-            </a:pPr>
-            <a:endParaRPr lang="en-US" sz="800" dirty="0" smtClean="0">
-              <a:latin typeface="Arial" pitchFamily="34" charset="0"/>
-              <a:cs typeface="Arial" pitchFamily="34" charset="0"/>
-            </a:endParaRPr>
-          </a:p>
-          <a:p>
-            <a:pPr>
-              <a:buNone/>
-            </a:pPr>
-            <a:endParaRPr lang="en-US" sz="800" dirty="0" smtClean="0">
-              <a:latin typeface="Arial" pitchFamily="34" charset="0"/>
-              <a:cs typeface="Arial" pitchFamily="34" charset="0"/>
-            </a:endParaRPr>
-          </a:p>
-          <a:p>
-            <a:pPr>
-              <a:buNone/>
-            </a:pPr>
-            <a:endParaRPr lang="en-US" sz="800" dirty="0" smtClean="0">
-              <a:latin typeface="Arial" pitchFamily="34" charset="0"/>
-              <a:cs typeface="Arial" pitchFamily="34" charset="0"/>
-            </a:endParaRPr>
-          </a:p>
-          <a:p>
-            <a:pPr>
-              <a:buNone/>
-            </a:pPr>
-            <a:endParaRPr lang="en-US" sz="800" dirty="0" smtClean="0">
-              <a:latin typeface="Arial" pitchFamily="34" charset="0"/>
-              <a:cs typeface="Arial" pitchFamily="34" charset="0"/>
-            </a:endParaRPr>
-          </a:p>
-          <a:p>
-            <a:pPr>
-              <a:buNone/>
-            </a:pPr>
-            <a:endParaRPr lang="en-US" sz="800" dirty="0" smtClean="0">
-              <a:latin typeface="Arial" pitchFamily="34" charset="0"/>
-              <a:cs typeface="Arial" pitchFamily="34" charset="0"/>
-            </a:endParaRPr>
-          </a:p>
-          <a:p>
-            <a:pPr>
-              <a:buNone/>
-            </a:pPr>
-            <a:endParaRPr lang="en-US" sz="800" dirty="0" smtClean="0">
-              <a:latin typeface="Arial" pitchFamily="34" charset="0"/>
-              <a:cs typeface="Arial" pitchFamily="34" charset="0"/>
-            </a:endParaRPr>
-          </a:p>
-          <a:p>
-            <a:r>
-              <a:rPr lang="en-US" sz="1800" dirty="0" smtClean="0">
-                <a:latin typeface="Arial" pitchFamily="34" charset="0"/>
-                <a:cs typeface="Arial" pitchFamily="34" charset="0"/>
-              </a:rPr>
-              <a:t>C is a floating point number.</a:t>
-            </a:r>
-          </a:p>
-          <a:p>
-            <a:endParaRPr lang="en-US" sz="800" dirty="0" smtClean="0">
-              <a:latin typeface="Arial" pitchFamily="34" charset="0"/>
-              <a:cs typeface="Arial" pitchFamily="34" charset="0"/>
-            </a:endParaRPr>
-          </a:p>
-          <a:p>
-            <a:r>
-              <a:rPr lang="en-US" sz="1800" dirty="0" smtClean="0">
-                <a:latin typeface="Arial" pitchFamily="34" charset="0"/>
-                <a:cs typeface="Arial" pitchFamily="34" charset="0"/>
-              </a:rPr>
-              <a:t>It’s by default 1.0.</a:t>
-            </a:r>
-          </a:p>
-          <a:p>
-            <a:endParaRPr lang="en-US" sz="800" dirty="0" smtClean="0">
-              <a:latin typeface="Arial" pitchFamily="34" charset="0"/>
-              <a:cs typeface="Arial" pitchFamily="34" charset="0"/>
-            </a:endParaRPr>
-          </a:p>
-          <a:p>
-            <a:r>
-              <a:rPr lang="en-US" sz="1800" dirty="0" smtClean="0">
-                <a:latin typeface="Arial" pitchFamily="34" charset="0"/>
-                <a:cs typeface="Arial" pitchFamily="34" charset="0"/>
-              </a:rPr>
-              <a:t>Also we can easily increase regularization by making the number smaller usually you’ll tune it in powers of 10 like 0.001,0.1,1,10,100,……,etc</a:t>
-            </a:r>
-            <a:r>
-              <a:rPr lang="en-US" sz="2000" dirty="0" smtClean="0">
-                <a:latin typeface="Arial" pitchFamily="34" charset="0"/>
-                <a:cs typeface="Arial" pitchFamily="34" charset="0"/>
-              </a:rPr>
-              <a:t>.</a:t>
-            </a:r>
-            <a:endParaRPr lang="en-US" sz="2000" dirty="0">
-              <a:latin typeface="Arial" pitchFamily="34" charset="0"/>
-              <a:cs typeface="Arial" pitchFamily="34" charset="0"/>
-            </a:endParaRPr>
+            <a:endParaRPr lang="en-US" dirty="0"/>
           </a:p>
         </p:txBody>
       </p:sp>
@@ -3397,8 +3236,8 @@
         </p:blipFill>
         <p:spPr>
           <a:xfrm>
-            <a:off x="2133601" y="2819400"/>
-            <a:ext cx="5029200" cy="2133600"/>
+            <a:off x="1981200" y="4038600"/>
+            <a:ext cx="4876800" cy="2133600"/>
           </a:xfrm>
           <a:prstGeom prst="rect">
             <a:avLst/>
@@ -3410,6 +3249,213 @@
   <p:clrMapOvr>
     <a:masterClrMapping/>
   </p:clrMapOvr>
+  <p:timing>
+    <p:tnLst>
+      <p:par>
+        <p:cTn id="1" dur="indefinite" restart="never" nodeType="tmRoot"/>
+      </p:par>
+    </p:tnLst>
+  </p:timing>
+</p:sld>
+</file>
+
+<file path=ppt/slides/slide3.xml><?xml version="1.0" encoding="utf-8"?>
+<p:sld xmlns:a="http://schemas.openxmlformats.org/drawingml/2006/main" xmlns:r="http://schemas.openxmlformats.org/officeDocument/2006/relationships" xmlns:p="http://schemas.openxmlformats.org/presentationml/2006/main">
+  <p:cSld>
+    <p:spTree>
+      <p:nvGrpSpPr>
+        <p:cNvPr id="1" name=""/>
+        <p:cNvGrpSpPr/>
+        <p:nvPr/>
+      </p:nvGrpSpPr>
+      <p:grpSpPr>
+        <a:xfrm>
+          <a:off x="0" y="0"/>
+          <a:ext cx="0" cy="0"/>
+          <a:chOff x="0" y="0"/>
+          <a:chExt cx="0" cy="0"/>
+        </a:xfrm>
+      </p:grpSpPr>
+      <p:sp>
+        <p:nvSpPr>
+          <p:cNvPr id="2" name="Title 1"/>
+          <p:cNvSpPr>
+            <a:spLocks noGrp="1"/>
+          </p:cNvSpPr>
+          <p:nvPr>
+            <p:ph type="title"/>
+          </p:nvPr>
+        </p:nvSpPr>
+        <p:spPr>
+          <a:xfrm>
+            <a:off x="457200" y="274638"/>
+            <a:ext cx="8229600" cy="792162"/>
+          </a:xfrm>
+        </p:spPr>
+        <p:txBody>
+          <a:bodyPr/>
+          <a:lstStyle/>
+          <a:p>
+            <a:r>
+              <a:rPr lang="en-US" dirty="0" smtClean="0"/>
+              <a:t>C in logistic regression parameter</a:t>
+            </a:r>
+            <a:endParaRPr lang="en-US" dirty="0"/>
+          </a:p>
+        </p:txBody>
+      </p:sp>
+      <p:sp>
+        <p:nvSpPr>
+          <p:cNvPr id="3" name="Content Placeholder 2"/>
+          <p:cNvSpPr>
+            <a:spLocks noGrp="1"/>
+          </p:cNvSpPr>
+          <p:nvPr>
+            <p:ph idx="1"/>
+          </p:nvPr>
+        </p:nvSpPr>
+        <p:spPr>
+          <a:xfrm>
+            <a:off x="228600" y="1143000"/>
+            <a:ext cx="8686800" cy="5486400"/>
+          </a:xfrm>
+        </p:spPr>
+        <p:txBody>
+          <a:bodyPr>
+            <a:normAutofit/>
+          </a:bodyPr>
+          <a:lstStyle/>
+          <a:p>
+            <a:endParaRPr lang="en-US" sz="1800" dirty="0" smtClean="0">
+              <a:latin typeface="Arial" pitchFamily="34" charset="0"/>
+              <a:cs typeface="Arial" pitchFamily="34" charset="0"/>
+            </a:endParaRPr>
+          </a:p>
+          <a:p>
+            <a:r>
+              <a:rPr lang="en-US" sz="2000" dirty="0" smtClean="0">
+                <a:latin typeface="Arial" pitchFamily="34" charset="0"/>
+                <a:cs typeface="Arial" pitchFamily="34" charset="0"/>
+              </a:rPr>
+              <a:t>It </a:t>
+            </a:r>
+            <a:r>
+              <a:rPr lang="en-US" sz="2000" dirty="0" smtClean="0">
+                <a:latin typeface="Arial" pitchFamily="34" charset="0"/>
+                <a:cs typeface="Arial" pitchFamily="34" charset="0"/>
+              </a:rPr>
+              <a:t>is used to represent the regularization strength and floats.</a:t>
+            </a:r>
+          </a:p>
+          <a:p>
+            <a:pPr>
+              <a:buNone/>
+            </a:pPr>
+            <a:endParaRPr lang="en-US" sz="2000" dirty="0" smtClean="0">
+              <a:latin typeface="Arial" pitchFamily="34" charset="0"/>
+              <a:cs typeface="Arial" pitchFamily="34" charset="0"/>
+            </a:endParaRPr>
+          </a:p>
+          <a:p>
+            <a:r>
+              <a:rPr lang="en-US" sz="2000" dirty="0" smtClean="0">
+                <a:latin typeface="Arial" pitchFamily="34" charset="0"/>
+                <a:cs typeface="Arial" pitchFamily="34" charset="0"/>
+              </a:rPr>
+              <a:t>Inverse of regularization strength; must be a positive float. Like in support vector machines, smaller values specify stronger regularization</a:t>
+            </a:r>
+            <a:r>
+              <a:rPr lang="en-US" sz="2000" dirty="0" smtClean="0">
+                <a:latin typeface="Arial" pitchFamily="34" charset="0"/>
+                <a:cs typeface="Arial" pitchFamily="34" charset="0"/>
+              </a:rPr>
+              <a:t>.</a:t>
+            </a:r>
+            <a:endParaRPr lang="en-US" sz="2000" dirty="0" smtClean="0">
+              <a:latin typeface="Arial" pitchFamily="34" charset="0"/>
+              <a:cs typeface="Arial" pitchFamily="34" charset="0"/>
+            </a:endParaRPr>
+          </a:p>
+          <a:p>
+            <a:pPr>
+              <a:buNone/>
+            </a:pPr>
+            <a:endParaRPr lang="en-US" sz="2000" dirty="0" smtClean="0">
+              <a:latin typeface="Arial" pitchFamily="34" charset="0"/>
+              <a:cs typeface="Arial" pitchFamily="34" charset="0"/>
+            </a:endParaRPr>
+          </a:p>
+          <a:p>
+            <a:r>
+              <a:rPr lang="en-US" sz="2000" dirty="0" smtClean="0">
+                <a:latin typeface="Arial" pitchFamily="34" charset="0"/>
+                <a:cs typeface="Arial" pitchFamily="34" charset="0"/>
+              </a:rPr>
+              <a:t>C is a floating point number.</a:t>
+            </a:r>
+          </a:p>
+          <a:p>
+            <a:endParaRPr lang="en-US" sz="2000" dirty="0" smtClean="0">
+              <a:latin typeface="Arial" pitchFamily="34" charset="0"/>
+              <a:cs typeface="Arial" pitchFamily="34" charset="0"/>
+            </a:endParaRPr>
+          </a:p>
+          <a:p>
+            <a:r>
+              <a:rPr lang="en-US" sz="2000" dirty="0" smtClean="0">
+                <a:latin typeface="Arial" pitchFamily="34" charset="0"/>
+                <a:cs typeface="Arial" pitchFamily="34" charset="0"/>
+              </a:rPr>
+              <a:t>It’s by default 1.0.</a:t>
+            </a:r>
+          </a:p>
+          <a:p>
+            <a:endParaRPr lang="en-US" sz="2000" dirty="0" smtClean="0">
+              <a:latin typeface="Arial" pitchFamily="34" charset="0"/>
+              <a:cs typeface="Arial" pitchFamily="34" charset="0"/>
+            </a:endParaRPr>
+          </a:p>
+          <a:p>
+            <a:r>
+              <a:rPr lang="en-US" sz="2000" dirty="0" smtClean="0">
+                <a:latin typeface="Arial" pitchFamily="34" charset="0"/>
+                <a:cs typeface="Arial" pitchFamily="34" charset="0"/>
+              </a:rPr>
+              <a:t>Also we can easily increase regularization by making the number smaller usually you’ll tune it in powers of 10 like </a:t>
+            </a:r>
+            <a:r>
+              <a:rPr lang="en-US" sz="2000" dirty="0" smtClean="0">
+                <a:latin typeface="Arial" pitchFamily="34" charset="0"/>
+                <a:cs typeface="Arial" pitchFamily="34" charset="0"/>
+              </a:rPr>
+              <a:t>0.001,0.1,1,……,</a:t>
+            </a:r>
+            <a:r>
+              <a:rPr lang="en-US" sz="2000" dirty="0" smtClean="0">
+                <a:latin typeface="Arial" pitchFamily="34" charset="0"/>
+                <a:cs typeface="Arial" pitchFamily="34" charset="0"/>
+              </a:rPr>
+              <a:t>etc.</a:t>
+            </a:r>
+            <a:endParaRPr lang="en-US" sz="2000" dirty="0">
+              <a:latin typeface="Arial" pitchFamily="34" charset="0"/>
+              <a:cs typeface="Arial" pitchFamily="34" charset="0"/>
+            </a:endParaRPr>
+          </a:p>
+        </p:txBody>
+      </p:sp>
+    </p:spTree>
+  </p:cSld>
+  <p:clrMapOvr>
+    <a:masterClrMapping/>
+  </p:clrMapOvr>
+  <p:timing>
+    <p:tnLst>
+      <p:par>
+        <p:cTn id="1" dur="indefinite" restart="never" nodeType="tmRoot"/>
+      </p:par>
+    </p:tnLst>
+  </p:timing>
 </p:sld>
 </file>
 

</xml_diff>